<commit_message>
A pedido do Daniel
</commit_message>
<xml_diff>
--- a/Presentation.pptx
+++ b/Presentation.pptx
@@ -29,7 +29,11 @@
     <p:sldId id="304" r:id="rId23"/>
     <p:sldId id="305" r:id="rId24"/>
     <p:sldId id="306" r:id="rId25"/>
-    <p:sldId id="293" r:id="rId26"/>
+    <p:sldId id="307" r:id="rId26"/>
+    <p:sldId id="309" r:id="rId27"/>
+    <p:sldId id="310" r:id="rId28"/>
+    <p:sldId id="312" r:id="rId29"/>
+    <p:sldId id="293" r:id="rId30"/>
   </p:sldIdLst>
   <p:sldSz cx="12192000" cy="6858000"/>
   <p:notesSz cx="6858000" cy="9144000"/>
@@ -11346,6 +11350,13 @@
   <p:clrMapOvr>
     <a:masterClrMapping/>
   </p:clrMapOvr>
+  <p:timing>
+    <p:tnLst>
+      <p:par>
+        <p:cTn id="1" dur="indefinite" restart="never" nodeType="tmRoot"/>
+      </p:par>
+    </p:tnLst>
+  </p:timing>
 </p:sld>
 </file>
 
@@ -11436,6 +11447,13 @@
   <p:clrMapOvr>
     <a:masterClrMapping/>
   </p:clrMapOvr>
+  <p:timing>
+    <p:tnLst>
+      <p:par>
+        <p:cTn id="1" dur="indefinite" restart="never" nodeType="tmRoot"/>
+      </p:par>
+    </p:tnLst>
+  </p:timing>
 </p:sld>
 </file>
 
@@ -11471,29 +11489,59 @@
           <a:bodyPr/>
           <a:lstStyle/>
           <a:p>
-            <a:endParaRPr lang="pt-PT"/>
-          </a:p>
-        </p:txBody>
-      </p:sp>
-      <p:sp>
-        <p:nvSpPr>
-          <p:cNvPr id="3" name="Content Placeholder 2"/>
-          <p:cNvSpPr>
-            <a:spLocks noGrp="1"/>
-          </p:cNvSpPr>
+            <a:r>
+              <a:rPr lang="pt-PT" dirty="0" err="1" smtClean="0"/>
+              <a:t>Call</a:t>
+            </a:r>
+            <a:r>
+              <a:rPr lang="pt-PT" dirty="0" smtClean="0"/>
+              <a:t> </a:t>
+            </a:r>
+            <a:r>
+              <a:rPr lang="pt-PT" dirty="0" err="1" smtClean="0"/>
+              <a:t>Next</a:t>
+            </a:r>
+            <a:r>
+              <a:rPr lang="pt-PT" dirty="0" smtClean="0"/>
+              <a:t> </a:t>
+            </a:r>
+            <a:r>
+              <a:rPr lang="pt-PT" dirty="0" err="1" smtClean="0"/>
+              <a:t>Method</a:t>
+            </a:r>
+            <a:endParaRPr lang="pt-PT" dirty="0"/>
+          </a:p>
+        </p:txBody>
+      </p:sp>
+      <p:pic>
+        <p:nvPicPr>
+          <p:cNvPr id="5" name="Content Placeholder 4"/>
+          <p:cNvPicPr>
+            <a:picLocks noGrp="1" noChangeAspect="1"/>
+          </p:cNvPicPr>
           <p:nvPr>
             <p:ph idx="1"/>
           </p:nvPr>
-        </p:nvSpPr>
-        <p:spPr/>
-        <p:txBody>
-          <a:bodyPr/>
-          <a:lstStyle/>
-          <a:p>
-            <a:endParaRPr lang="pt-PT"/>
-          </a:p>
-        </p:txBody>
-      </p:sp>
+        </p:nvPicPr>
+        <p:blipFill>
+          <a:blip r:embed="rId2">
+            <a:extLst>
+              <a:ext uri="{28A0092B-C50C-407E-A947-70E740481C1C}">
+                <a14:useLocalDpi xmlns:a14="http://schemas.microsoft.com/office/drawing/2010/main" val="0"/>
+              </a:ext>
+            </a:extLst>
+          </a:blip>
+          <a:stretch>
+            <a:fillRect/>
+          </a:stretch>
+        </p:blipFill>
+        <p:spPr>
+          <a:xfrm>
+            <a:off x="2693987" y="2832894"/>
+            <a:ext cx="7086600" cy="2336800"/>
+          </a:xfrm>
+        </p:spPr>
+      </p:pic>
     </p:spTree>
     <p:extLst>
       <p:ext uri="{BB962C8B-B14F-4D97-AF65-F5344CB8AC3E}">
@@ -11504,10 +11552,383 @@
   <p:clrMapOvr>
     <a:masterClrMapping/>
   </p:clrMapOvr>
+  <p:timing>
+    <p:tnLst>
+      <p:par>
+        <p:cTn id="1" dur="indefinite" restart="never" nodeType="tmRoot"/>
+      </p:par>
+    </p:tnLst>
+  </p:timing>
 </p:sld>
 </file>
 
 <file path=ppt/slides/slide25.xml><?xml version="1.0" encoding="utf-8"?>
+<p:sld xmlns:a="http://schemas.openxmlformats.org/drawingml/2006/main" xmlns:r="http://schemas.openxmlformats.org/officeDocument/2006/relationships" xmlns:p="http://schemas.openxmlformats.org/presentationml/2006/main">
+  <p:cSld>
+    <p:spTree>
+      <p:nvGrpSpPr>
+        <p:cNvPr id="1" name=""/>
+        <p:cNvGrpSpPr/>
+        <p:nvPr/>
+      </p:nvGrpSpPr>
+      <p:grpSpPr>
+        <a:xfrm>
+          <a:off x="0" y="0"/>
+          <a:ext cx="0" cy="0"/>
+          <a:chOff x="0" y="0"/>
+          <a:chExt cx="0" cy="0"/>
+        </a:xfrm>
+      </p:grpSpPr>
+      <p:sp>
+        <p:nvSpPr>
+          <p:cNvPr id="2" name="Title 1"/>
+          <p:cNvSpPr>
+            <a:spLocks noGrp="1"/>
+          </p:cNvSpPr>
+          <p:nvPr>
+            <p:ph type="title"/>
+          </p:nvPr>
+        </p:nvSpPr>
+        <p:spPr/>
+        <p:txBody>
+          <a:bodyPr/>
+          <a:lstStyle/>
+          <a:p>
+            <a:r>
+              <a:rPr lang="pt-PT" dirty="0" err="1" smtClean="0"/>
+              <a:t>Call</a:t>
+            </a:r>
+            <a:r>
+              <a:rPr lang="pt-PT" dirty="0" smtClean="0"/>
+              <a:t> </a:t>
+            </a:r>
+            <a:r>
+              <a:rPr lang="pt-PT" dirty="0" err="1" smtClean="0"/>
+              <a:t>Next</a:t>
+            </a:r>
+            <a:r>
+              <a:rPr lang="pt-PT" dirty="0" smtClean="0"/>
+              <a:t> </a:t>
+            </a:r>
+            <a:r>
+              <a:rPr lang="pt-PT" dirty="0" err="1" smtClean="0"/>
+              <a:t>Method</a:t>
+            </a:r>
+            <a:endParaRPr lang="pt-PT" dirty="0"/>
+          </a:p>
+        </p:txBody>
+      </p:sp>
+      <p:pic>
+        <p:nvPicPr>
+          <p:cNvPr id="4" name="Content Placeholder 3"/>
+          <p:cNvPicPr>
+            <a:picLocks noGrp="1" noChangeAspect="1"/>
+          </p:cNvPicPr>
+          <p:nvPr>
+            <p:ph idx="1"/>
+          </p:nvPr>
+        </p:nvPicPr>
+        <p:blipFill>
+          <a:blip r:embed="rId2">
+            <a:extLst>
+              <a:ext uri="{28A0092B-C50C-407E-A947-70E740481C1C}">
+                <a14:useLocalDpi xmlns:a14="http://schemas.microsoft.com/office/drawing/2010/main" val="0"/>
+              </a:ext>
+            </a:extLst>
+          </a:blip>
+          <a:stretch>
+            <a:fillRect/>
+          </a:stretch>
+        </p:blipFill>
+        <p:spPr>
+          <a:xfrm>
+            <a:off x="2258617" y="1825625"/>
+            <a:ext cx="7957340" cy="4351338"/>
+          </a:xfrm>
+        </p:spPr>
+      </p:pic>
+    </p:spTree>
+    <p:extLst>
+      <p:ext uri="{BB962C8B-B14F-4D97-AF65-F5344CB8AC3E}">
+        <p14:creationId xmlns:p14="http://schemas.microsoft.com/office/powerpoint/2010/main" val="1735738924"/>
+      </p:ext>
+    </p:extLst>
+  </p:cSld>
+  <p:clrMapOvr>
+    <a:masterClrMapping/>
+  </p:clrMapOvr>
+  <p:timing>
+    <p:tnLst>
+      <p:par>
+        <p:cTn id="1" dur="indefinite" restart="never" nodeType="tmRoot"/>
+      </p:par>
+    </p:tnLst>
+  </p:timing>
+</p:sld>
+</file>
+
+<file path=ppt/slides/slide26.xml><?xml version="1.0" encoding="utf-8"?>
+<p:sld xmlns:a="http://schemas.openxmlformats.org/drawingml/2006/main" xmlns:r="http://schemas.openxmlformats.org/officeDocument/2006/relationships" xmlns:p="http://schemas.openxmlformats.org/presentationml/2006/main">
+  <p:cSld>
+    <p:spTree>
+      <p:nvGrpSpPr>
+        <p:cNvPr id="1" name=""/>
+        <p:cNvGrpSpPr/>
+        <p:nvPr/>
+      </p:nvGrpSpPr>
+      <p:grpSpPr>
+        <a:xfrm>
+          <a:off x="0" y="0"/>
+          <a:ext cx="0" cy="0"/>
+          <a:chOff x="0" y="0"/>
+          <a:chExt cx="0" cy="0"/>
+        </a:xfrm>
+      </p:grpSpPr>
+      <p:sp>
+        <p:nvSpPr>
+          <p:cNvPr id="2" name="Title 1"/>
+          <p:cNvSpPr>
+            <a:spLocks noGrp="1"/>
+          </p:cNvSpPr>
+          <p:nvPr>
+            <p:ph type="title"/>
+          </p:nvPr>
+        </p:nvSpPr>
+        <p:spPr/>
+        <p:txBody>
+          <a:bodyPr/>
+          <a:lstStyle/>
+          <a:p>
+            <a:r>
+              <a:rPr lang="pt-PT" dirty="0" err="1" smtClean="0"/>
+              <a:t>Around</a:t>
+            </a:r>
+            <a:r>
+              <a:rPr lang="pt-PT" dirty="0" smtClean="0"/>
+              <a:t> </a:t>
+            </a:r>
+            <a:r>
+              <a:rPr lang="pt-PT" dirty="0" err="1" smtClean="0"/>
+              <a:t>Combinator</a:t>
+            </a:r>
+            <a:endParaRPr lang="pt-PT" dirty="0"/>
+          </a:p>
+        </p:txBody>
+      </p:sp>
+      <p:pic>
+        <p:nvPicPr>
+          <p:cNvPr id="6" name="Content Placeholder 5"/>
+          <p:cNvPicPr>
+            <a:picLocks noGrp="1" noChangeAspect="1"/>
+          </p:cNvPicPr>
+          <p:nvPr>
+            <p:ph idx="1"/>
+          </p:nvPr>
+        </p:nvPicPr>
+        <p:blipFill>
+          <a:blip r:embed="rId2">
+            <a:extLst>
+              <a:ext uri="{28A0092B-C50C-407E-A947-70E740481C1C}">
+                <a14:useLocalDpi xmlns:a14="http://schemas.microsoft.com/office/drawing/2010/main" val="0"/>
+              </a:ext>
+            </a:extLst>
+          </a:blip>
+          <a:stretch>
+            <a:fillRect/>
+          </a:stretch>
+        </p:blipFill>
+        <p:spPr>
+          <a:xfrm>
+            <a:off x="1729675" y="1504348"/>
+            <a:ext cx="8732650" cy="5032375"/>
+          </a:xfrm>
+        </p:spPr>
+      </p:pic>
+    </p:spTree>
+    <p:extLst>
+      <p:ext uri="{BB962C8B-B14F-4D97-AF65-F5344CB8AC3E}">
+        <p14:creationId xmlns:p14="http://schemas.microsoft.com/office/powerpoint/2010/main" val="1024920750"/>
+      </p:ext>
+    </p:extLst>
+  </p:cSld>
+  <p:clrMapOvr>
+    <a:masterClrMapping/>
+  </p:clrMapOvr>
+  <p:timing>
+    <p:tnLst>
+      <p:par>
+        <p:cTn id="1" dur="indefinite" restart="never" nodeType="tmRoot"/>
+      </p:par>
+    </p:tnLst>
+  </p:timing>
+</p:sld>
+</file>
+
+<file path=ppt/slides/slide27.xml><?xml version="1.0" encoding="utf-8"?>
+<p:sld xmlns:a="http://schemas.openxmlformats.org/drawingml/2006/main" xmlns:r="http://schemas.openxmlformats.org/officeDocument/2006/relationships" xmlns:p="http://schemas.openxmlformats.org/presentationml/2006/main">
+  <p:cSld>
+    <p:spTree>
+      <p:nvGrpSpPr>
+        <p:cNvPr id="1" name=""/>
+        <p:cNvGrpSpPr/>
+        <p:nvPr/>
+      </p:nvGrpSpPr>
+      <p:grpSpPr>
+        <a:xfrm>
+          <a:off x="0" y="0"/>
+          <a:ext cx="0" cy="0"/>
+          <a:chOff x="0" y="0"/>
+          <a:chExt cx="0" cy="0"/>
+        </a:xfrm>
+      </p:grpSpPr>
+      <p:sp>
+        <p:nvSpPr>
+          <p:cNvPr id="2" name="Title 1"/>
+          <p:cNvSpPr>
+            <a:spLocks noGrp="1"/>
+          </p:cNvSpPr>
+          <p:nvPr>
+            <p:ph type="title"/>
+          </p:nvPr>
+        </p:nvSpPr>
+        <p:spPr/>
+        <p:txBody>
+          <a:bodyPr/>
+          <a:lstStyle/>
+          <a:p>
+            <a:r>
+              <a:rPr lang="pt-PT" dirty="0" err="1" smtClean="0"/>
+              <a:t>Example</a:t>
+            </a:r>
+            <a:endParaRPr lang="pt-PT" dirty="0"/>
+          </a:p>
+        </p:txBody>
+      </p:sp>
+      <p:pic>
+        <p:nvPicPr>
+          <p:cNvPr id="6" name="Content Placeholder 5"/>
+          <p:cNvPicPr>
+            <a:picLocks noGrp="1" noChangeAspect="1"/>
+          </p:cNvPicPr>
+          <p:nvPr>
+            <p:ph idx="1"/>
+          </p:nvPr>
+        </p:nvPicPr>
+        <p:blipFill>
+          <a:blip r:embed="rId2">
+            <a:extLst>
+              <a:ext uri="{28A0092B-C50C-407E-A947-70E740481C1C}">
+                <a14:useLocalDpi xmlns:a14="http://schemas.microsoft.com/office/drawing/2010/main" val="0"/>
+              </a:ext>
+            </a:extLst>
+          </a:blip>
+          <a:stretch>
+            <a:fillRect/>
+          </a:stretch>
+        </p:blipFill>
+        <p:spPr>
+          <a:xfrm>
+            <a:off x="3300776" y="1825625"/>
+            <a:ext cx="5873023" cy="4351338"/>
+          </a:xfrm>
+        </p:spPr>
+      </p:pic>
+    </p:spTree>
+    <p:extLst>
+      <p:ext uri="{BB962C8B-B14F-4D97-AF65-F5344CB8AC3E}">
+        <p14:creationId xmlns:p14="http://schemas.microsoft.com/office/powerpoint/2010/main" val="1024424974"/>
+      </p:ext>
+    </p:extLst>
+  </p:cSld>
+  <p:clrMapOvr>
+    <a:masterClrMapping/>
+  </p:clrMapOvr>
+</p:sld>
+</file>
+
+<file path=ppt/slides/slide28.xml><?xml version="1.0" encoding="utf-8"?>
+<p:sld xmlns:a="http://schemas.openxmlformats.org/drawingml/2006/main" xmlns:r="http://schemas.openxmlformats.org/officeDocument/2006/relationships" xmlns:p="http://schemas.openxmlformats.org/presentationml/2006/main">
+  <p:cSld>
+    <p:spTree>
+      <p:nvGrpSpPr>
+        <p:cNvPr id="1" name=""/>
+        <p:cNvGrpSpPr/>
+        <p:nvPr/>
+      </p:nvGrpSpPr>
+      <p:grpSpPr>
+        <a:xfrm>
+          <a:off x="0" y="0"/>
+          <a:ext cx="0" cy="0"/>
+          <a:chOff x="0" y="0"/>
+          <a:chExt cx="0" cy="0"/>
+        </a:xfrm>
+      </p:grpSpPr>
+      <p:sp>
+        <p:nvSpPr>
+          <p:cNvPr id="2" name="Title 1"/>
+          <p:cNvSpPr>
+            <a:spLocks noGrp="1"/>
+          </p:cNvSpPr>
+          <p:nvPr>
+            <p:ph type="title"/>
+          </p:nvPr>
+        </p:nvSpPr>
+        <p:spPr/>
+        <p:txBody>
+          <a:bodyPr/>
+          <a:lstStyle/>
+          <a:p>
+            <a:r>
+              <a:rPr lang="pt-PT" dirty="0" err="1" smtClean="0"/>
+              <a:t>Example</a:t>
+            </a:r>
+            <a:endParaRPr lang="pt-PT" dirty="0"/>
+          </a:p>
+        </p:txBody>
+      </p:sp>
+      <p:pic>
+        <p:nvPicPr>
+          <p:cNvPr id="4" name="Content Placeholder 3"/>
+          <p:cNvPicPr>
+            <a:picLocks noGrp="1" noChangeAspect="1"/>
+          </p:cNvPicPr>
+          <p:nvPr>
+            <p:ph idx="1"/>
+          </p:nvPr>
+        </p:nvPicPr>
+        <p:blipFill>
+          <a:blip r:embed="rId2">
+            <a:extLst>
+              <a:ext uri="{28A0092B-C50C-407E-A947-70E740481C1C}">
+                <a14:useLocalDpi xmlns:a14="http://schemas.microsoft.com/office/drawing/2010/main" val="0"/>
+              </a:ext>
+            </a:extLst>
+          </a:blip>
+          <a:stretch>
+            <a:fillRect/>
+          </a:stretch>
+        </p:blipFill>
+        <p:spPr>
+          <a:xfrm>
+            <a:off x="1388654" y="1825625"/>
+            <a:ext cx="9697267" cy="4351338"/>
+          </a:xfrm>
+        </p:spPr>
+      </p:pic>
+    </p:spTree>
+    <p:extLst>
+      <p:ext uri="{BB962C8B-B14F-4D97-AF65-F5344CB8AC3E}">
+        <p14:creationId xmlns:p14="http://schemas.microsoft.com/office/powerpoint/2010/main" val="2026998572"/>
+      </p:ext>
+    </p:extLst>
+  </p:cSld>
+  <p:clrMapOvr>
+    <a:masterClrMapping/>
+  </p:clrMapOvr>
+</p:sld>
+</file>
+
+<file path=ppt/slides/slide29.xml><?xml version="1.0" encoding="utf-8"?>
 <p:sld xmlns:a="http://schemas.openxmlformats.org/drawingml/2006/main" xmlns:r="http://schemas.openxmlformats.org/officeDocument/2006/relationships" xmlns:p="http://schemas.openxmlformats.org/presentationml/2006/main">
   <p:cSld>
     <p:spTree>

</xml_diff>